<commit_message>
Added question for client
</commit_message>
<xml_diff>
--- a/docs/ODBC2KML Requrements Meeting.pptx
+++ b/docs/ODBC2KML Requrements Meeting.pptx
@@ -205,7 +205,7 @@
             <a:fld id="{85A68EFB-1316-444C-A87F-A3B405362BF0}" type="datetimeFigureOut">
               <a:rPr lang="en-US" smtClean="0"/>
               <a:pPr/>
-              <a:t>10/22/2009</a:t>
+              <a:t>10/29/2009</a:t>
             </a:fld>
             <a:endParaRPr lang="en-US"/>
           </a:p>
@@ -526,7 +526,7 @@
         <p:nvSpPr>
           <p:cNvPr id="6145" name="Rectangle 1"/>
           <p:cNvSpPr txBox="1">
-            <a:spLocks noChangeArrowheads="1"/>
+            <a:spLocks noGrp="1" noRot="1" noChangeAspect="1" noChangeArrowheads="1"/>
           </p:cNvSpPr>
           <p:nvPr>
             <p:ph type="sldImg"/>
@@ -557,7 +557,7 @@
         <p:nvSpPr>
           <p:cNvPr id="6146" name="Rectangle 2"/>
           <p:cNvSpPr txBox="1">
-            <a:spLocks noChangeArrowheads="1"/>
+            <a:spLocks noGrp="1" noChangeArrowheads="1"/>
           </p:cNvSpPr>
           <p:nvPr>
             <p:ph type="body" idx="1"/>
@@ -649,7 +649,7 @@
         <p:nvSpPr>
           <p:cNvPr id="7169" name="Rectangle 1"/>
           <p:cNvSpPr txBox="1">
-            <a:spLocks noChangeArrowheads="1"/>
+            <a:spLocks noGrp="1" noRot="1" noChangeAspect="1" noChangeArrowheads="1"/>
           </p:cNvSpPr>
           <p:nvPr>
             <p:ph type="sldImg"/>
@@ -680,7 +680,7 @@
         <p:nvSpPr>
           <p:cNvPr id="7170" name="Rectangle 2"/>
           <p:cNvSpPr txBox="1">
-            <a:spLocks noChangeArrowheads="1"/>
+            <a:spLocks noGrp="1" noChangeArrowheads="1"/>
           </p:cNvSpPr>
           <p:nvPr>
             <p:ph type="body" idx="1"/>
@@ -772,7 +772,7 @@
         <p:nvSpPr>
           <p:cNvPr id="8193" name="Rectangle 1"/>
           <p:cNvSpPr txBox="1">
-            <a:spLocks noChangeArrowheads="1"/>
+            <a:spLocks noGrp="1" noRot="1" noChangeAspect="1" noChangeArrowheads="1"/>
           </p:cNvSpPr>
           <p:nvPr>
             <p:ph type="sldImg"/>
@@ -803,7 +803,7 @@
         <p:nvSpPr>
           <p:cNvPr id="8194" name="Rectangle 2"/>
           <p:cNvSpPr txBox="1">
-            <a:spLocks noChangeArrowheads="1"/>
+            <a:spLocks noGrp="1" noChangeArrowheads="1"/>
           </p:cNvSpPr>
           <p:nvPr>
             <p:ph type="body" idx="1"/>
@@ -1060,7 +1060,7 @@
             <a:fld id="{EDEB2150-E434-4AFF-A209-1B6D19CA9216}" type="datetimeFigureOut">
               <a:rPr lang="en-US" smtClean="0"/>
               <a:pPr/>
-              <a:t>10/22/2009</a:t>
+              <a:t>10/29/2009</a:t>
             </a:fld>
             <a:endParaRPr lang="en-US"/>
           </a:p>
@@ -1249,7 +1249,7 @@
             <a:fld id="{EDEB2150-E434-4AFF-A209-1B6D19CA9216}" type="datetimeFigureOut">
               <a:rPr lang="en-US" smtClean="0"/>
               <a:pPr/>
-              <a:t>10/22/2009</a:t>
+              <a:t>10/29/2009</a:t>
             </a:fld>
             <a:endParaRPr lang="en-US"/>
           </a:p>
@@ -1426,7 +1426,7 @@
             <a:fld id="{EDEB2150-E434-4AFF-A209-1B6D19CA9216}" type="datetimeFigureOut">
               <a:rPr lang="en-US" smtClean="0"/>
               <a:pPr/>
-              <a:t>10/22/2009</a:t>
+              <a:t>10/29/2009</a:t>
             </a:fld>
             <a:endParaRPr lang="en-US"/>
           </a:p>
@@ -1608,7 +1608,7 @@
             <a:fld id="{EDEB2150-E434-4AFF-A209-1B6D19CA9216}" type="datetimeFigureOut">
               <a:rPr lang="en-US" smtClean="0"/>
               <a:pPr/>
-              <a:t>10/22/2009</a:t>
+              <a:t>10/29/2009</a:t>
             </a:fld>
             <a:endParaRPr lang="en-US"/>
           </a:p>
@@ -1857,7 +1857,7 @@
             <a:fld id="{EDEB2150-E434-4AFF-A209-1B6D19CA9216}" type="datetimeFigureOut">
               <a:rPr lang="en-US" smtClean="0"/>
               <a:pPr/>
-              <a:t>10/22/2009</a:t>
+              <a:t>10/29/2009</a:t>
             </a:fld>
             <a:endParaRPr lang="en-US"/>
           </a:p>
@@ -2333,7 +2333,7 @@
             <a:fld id="{EDEB2150-E434-4AFF-A209-1B6D19CA9216}" type="datetimeFigureOut">
               <a:rPr lang="en-US" smtClean="0"/>
               <a:pPr/>
-              <a:t>10/22/2009</a:t>
+              <a:t>10/29/2009</a:t>
             </a:fld>
             <a:endParaRPr lang="en-US"/>
           </a:p>
@@ -2750,7 +2750,7 @@
             <a:fld id="{EDEB2150-E434-4AFF-A209-1B6D19CA9216}" type="datetimeFigureOut">
               <a:rPr lang="en-US" smtClean="0"/>
               <a:pPr/>
-              <a:t>10/22/2009</a:t>
+              <a:t>10/29/2009</a:t>
             </a:fld>
             <a:endParaRPr lang="en-US"/>
           </a:p>
@@ -2883,7 +2883,7 @@
             <a:fld id="{EDEB2150-E434-4AFF-A209-1B6D19CA9216}" type="datetimeFigureOut">
               <a:rPr lang="en-US" smtClean="0"/>
               <a:pPr/>
-              <a:t>10/22/2009</a:t>
+              <a:t>10/29/2009</a:t>
             </a:fld>
             <a:endParaRPr lang="en-US"/>
           </a:p>
@@ -2980,7 +2980,7 @@
             <a:fld id="{EDEB2150-E434-4AFF-A209-1B6D19CA9216}" type="datetimeFigureOut">
               <a:rPr lang="en-US" smtClean="0"/>
               <a:pPr/>
-              <a:t>10/22/2009</a:t>
+              <a:t>10/29/2009</a:t>
             </a:fld>
             <a:endParaRPr lang="en-US"/>
           </a:p>
@@ -3260,7 +3260,7 @@
             <a:fld id="{EDEB2150-E434-4AFF-A209-1B6D19CA9216}" type="datetimeFigureOut">
               <a:rPr lang="en-US" smtClean="0"/>
               <a:pPr/>
-              <a:t>10/22/2009</a:t>
+              <a:t>10/29/2009</a:t>
             </a:fld>
             <a:endParaRPr lang="en-US"/>
           </a:p>
@@ -3514,7 +3514,7 @@
             <a:fld id="{EDEB2150-E434-4AFF-A209-1B6D19CA9216}" type="datetimeFigureOut">
               <a:rPr lang="en-US" smtClean="0"/>
               <a:pPr/>
-              <a:t>10/22/2009</a:t>
+              <a:t>10/29/2009</a:t>
             </a:fld>
             <a:endParaRPr lang="en-US"/>
           </a:p>
@@ -3888,7 +3888,7 @@
             <a:fld id="{EDEB2150-E434-4AFF-A209-1B6D19CA9216}" type="datetimeFigureOut">
               <a:rPr lang="en-US" smtClean="0"/>
               <a:pPr/>
-              <a:t>10/22/2009</a:t>
+              <a:t>10/29/2009</a:t>
             </a:fld>
             <a:endParaRPr lang="en-US"/>
           </a:p>
@@ -4562,7 +4562,17 @@
           <a:p>
             <a:r>
               <a:rPr lang="en-US" dirty="0" smtClean="0"/>
-              <a:t>Individual descriptions for table rows</a:t>
+              <a:t>Individual descriptions for table </a:t>
+            </a:r>
+            <a:r>
+              <a:rPr lang="en-US" dirty="0" smtClean="0"/>
+              <a:t>rows</a:t>
+            </a:r>
+          </a:p>
+          <a:p>
+            <a:r>
+              <a:rPr lang="en-US" dirty="0" smtClean="0"/>
+              <a:t>Support for multiple tables per connection</a:t>
             </a:r>
             <a:endParaRPr lang="en-US" dirty="0"/>
           </a:p>
@@ -4979,7 +4989,7 @@
   <p:timing>
     <p:tnLst>
       <p:par>
-        <p:cTn id="1" dur="indefinite" nodeType="tmRoot">
+        <p:cTn id="1" dur="indefinite" restart="never" nodeType="tmRoot">
           <p:childTnLst>
             <p:seq concurrent="1" nextAc="seek">
               <p:cTn id="2" dur="0" nodeType="mainSeq"/>
@@ -5252,7 +5262,7 @@
   <p:timing>
     <p:tnLst>
       <p:par>
-        <p:cTn id="1" dur="indefinite" nodeType="tmRoot">
+        <p:cTn id="1" dur="indefinite" restart="never" nodeType="tmRoot">
           <p:childTnLst>
             <p:seq concurrent="1" nextAc="seek">
               <p:cTn id="2" dur="0" nodeType="mainSeq"/>
@@ -5527,7 +5537,7 @@
   <p:timing>
     <p:tnLst>
       <p:par>
-        <p:cTn id="1" dur="indefinite" nodeType="tmRoot">
+        <p:cTn id="1" dur="indefinite" restart="never" nodeType="tmRoot">
           <p:childTnLst>
             <p:seq concurrent="1" nextAc="seek">
               <p:cTn id="2" dur="0" nodeType="mainSeq"/>

</xml_diff>

<commit_message>
Changed the date to November 5, 2009
</commit_message>
<xml_diff>
--- a/docs/ODBC2KML Requrements Meeting.pptx
+++ b/docs/ODBC2KML Requrements Meeting.pptx
@@ -205,7 +205,7 @@
             <a:fld id="{85A68EFB-1316-444C-A87F-A3B405362BF0}" type="datetimeFigureOut">
               <a:rPr lang="en-US" smtClean="0"/>
               <a:pPr/>
-              <a:t>10/29/2009</a:t>
+              <a:t>11/5/2009</a:t>
             </a:fld>
             <a:endParaRPr lang="en-US"/>
           </a:p>
@@ -1060,7 +1060,7 @@
             <a:fld id="{EDEB2150-E434-4AFF-A209-1B6D19CA9216}" type="datetimeFigureOut">
               <a:rPr lang="en-US" smtClean="0"/>
               <a:pPr/>
-              <a:t>10/29/2009</a:t>
+              <a:t>11/5/2009</a:t>
             </a:fld>
             <a:endParaRPr lang="en-US"/>
           </a:p>
@@ -1249,7 +1249,7 @@
             <a:fld id="{EDEB2150-E434-4AFF-A209-1B6D19CA9216}" type="datetimeFigureOut">
               <a:rPr lang="en-US" smtClean="0"/>
               <a:pPr/>
-              <a:t>10/29/2009</a:t>
+              <a:t>11/5/2009</a:t>
             </a:fld>
             <a:endParaRPr lang="en-US"/>
           </a:p>
@@ -1426,7 +1426,7 @@
             <a:fld id="{EDEB2150-E434-4AFF-A209-1B6D19CA9216}" type="datetimeFigureOut">
               <a:rPr lang="en-US" smtClean="0"/>
               <a:pPr/>
-              <a:t>10/29/2009</a:t>
+              <a:t>11/5/2009</a:t>
             </a:fld>
             <a:endParaRPr lang="en-US"/>
           </a:p>
@@ -1608,7 +1608,7 @@
             <a:fld id="{EDEB2150-E434-4AFF-A209-1B6D19CA9216}" type="datetimeFigureOut">
               <a:rPr lang="en-US" smtClean="0"/>
               <a:pPr/>
-              <a:t>10/29/2009</a:t>
+              <a:t>11/5/2009</a:t>
             </a:fld>
             <a:endParaRPr lang="en-US"/>
           </a:p>
@@ -1857,7 +1857,7 @@
             <a:fld id="{EDEB2150-E434-4AFF-A209-1B6D19CA9216}" type="datetimeFigureOut">
               <a:rPr lang="en-US" smtClean="0"/>
               <a:pPr/>
-              <a:t>10/29/2009</a:t>
+              <a:t>11/5/2009</a:t>
             </a:fld>
             <a:endParaRPr lang="en-US"/>
           </a:p>
@@ -2333,7 +2333,7 @@
             <a:fld id="{EDEB2150-E434-4AFF-A209-1B6D19CA9216}" type="datetimeFigureOut">
               <a:rPr lang="en-US" smtClean="0"/>
               <a:pPr/>
-              <a:t>10/29/2009</a:t>
+              <a:t>11/5/2009</a:t>
             </a:fld>
             <a:endParaRPr lang="en-US"/>
           </a:p>
@@ -2750,7 +2750,7 @@
             <a:fld id="{EDEB2150-E434-4AFF-A209-1B6D19CA9216}" type="datetimeFigureOut">
               <a:rPr lang="en-US" smtClean="0"/>
               <a:pPr/>
-              <a:t>10/29/2009</a:t>
+              <a:t>11/5/2009</a:t>
             </a:fld>
             <a:endParaRPr lang="en-US"/>
           </a:p>
@@ -2883,7 +2883,7 @@
             <a:fld id="{EDEB2150-E434-4AFF-A209-1B6D19CA9216}" type="datetimeFigureOut">
               <a:rPr lang="en-US" smtClean="0"/>
               <a:pPr/>
-              <a:t>10/29/2009</a:t>
+              <a:t>11/5/2009</a:t>
             </a:fld>
             <a:endParaRPr lang="en-US"/>
           </a:p>
@@ -2980,7 +2980,7 @@
             <a:fld id="{EDEB2150-E434-4AFF-A209-1B6D19CA9216}" type="datetimeFigureOut">
               <a:rPr lang="en-US" smtClean="0"/>
               <a:pPr/>
-              <a:t>10/29/2009</a:t>
+              <a:t>11/5/2009</a:t>
             </a:fld>
             <a:endParaRPr lang="en-US"/>
           </a:p>
@@ -3260,7 +3260,7 @@
             <a:fld id="{EDEB2150-E434-4AFF-A209-1B6D19CA9216}" type="datetimeFigureOut">
               <a:rPr lang="en-US" smtClean="0"/>
               <a:pPr/>
-              <a:t>10/29/2009</a:t>
+              <a:t>11/5/2009</a:t>
             </a:fld>
             <a:endParaRPr lang="en-US"/>
           </a:p>
@@ -3514,7 +3514,7 @@
             <a:fld id="{EDEB2150-E434-4AFF-A209-1B6D19CA9216}" type="datetimeFigureOut">
               <a:rPr lang="en-US" smtClean="0"/>
               <a:pPr/>
-              <a:t>10/29/2009</a:t>
+              <a:t>11/5/2009</a:t>
             </a:fld>
             <a:endParaRPr lang="en-US"/>
           </a:p>
@@ -3888,7 +3888,7 @@
             <a:fld id="{EDEB2150-E434-4AFF-A209-1B6D19CA9216}" type="datetimeFigureOut">
               <a:rPr lang="en-US" smtClean="0"/>
               <a:pPr/>
-              <a:t>10/29/2009</a:t>
+              <a:t>11/5/2009</a:t>
             </a:fld>
             <a:endParaRPr lang="en-US"/>
           </a:p>
@@ -4379,8 +4379,12 @@
           </a:p>
           <a:p>
             <a:r>
+              <a:rPr lang="en-US" b="1" smtClean="0"/>
+              <a:t>November 5, </a:t>
+            </a:r>
+            <a:r>
               <a:rPr lang="en-US" b="1" dirty="0" smtClean="0"/>
-              <a:t>October 27, 2009</a:t>
+              <a:t>2009</a:t>
             </a:r>
             <a:endParaRPr lang="en-US" b="1" dirty="0"/>
           </a:p>
@@ -4562,11 +4566,7 @@
           <a:p>
             <a:r>
               <a:rPr lang="en-US" dirty="0" smtClean="0"/>
-              <a:t>Individual descriptions for table </a:t>
-            </a:r>
-            <a:r>
-              <a:rPr lang="en-US" dirty="0" smtClean="0"/>
-              <a:t>rows</a:t>
+              <a:t>Individual descriptions for table rows</a:t>
             </a:r>
           </a:p>
           <a:p>

</xml_diff>

<commit_message>
-Added Screenshots of the system. -Added Screenshots to the requirements powerpoint.
</commit_message>
<xml_diff>
--- a/docs/ODBC2KML Requrements Meeting.pptx
+++ b/docs/ODBC2KML Requrements Meeting.pptx
@@ -5,7 +5,7 @@
     <p:sldMasterId id="2147483744" r:id="rId1"/>
   </p:sldMasterIdLst>
   <p:notesMasterIdLst>
-    <p:notesMasterId r:id="rId15"/>
+    <p:notesMasterId r:id="rId23"/>
   </p:notesMasterIdLst>
   <p:sldIdLst>
     <p:sldId id="256" r:id="rId2"/>
@@ -18,9 +18,17 @@
     <p:sldId id="259" r:id="rId9"/>
     <p:sldId id="264" r:id="rId10"/>
     <p:sldId id="260" r:id="rId11"/>
-    <p:sldId id="265" r:id="rId12"/>
-    <p:sldId id="261" r:id="rId13"/>
-    <p:sldId id="262" r:id="rId14"/>
+    <p:sldId id="276" r:id="rId12"/>
+    <p:sldId id="270" r:id="rId13"/>
+    <p:sldId id="275" r:id="rId14"/>
+    <p:sldId id="274" r:id="rId15"/>
+    <p:sldId id="271" r:id="rId16"/>
+    <p:sldId id="272" r:id="rId17"/>
+    <p:sldId id="277" r:id="rId18"/>
+    <p:sldId id="273" r:id="rId19"/>
+    <p:sldId id="265" r:id="rId20"/>
+    <p:sldId id="261" r:id="rId21"/>
+    <p:sldId id="262" r:id="rId22"/>
   </p:sldIdLst>
   <p:sldSz cx="9144000" cy="6858000" type="screen4x3"/>
   <p:notesSz cx="6858000" cy="9144000"/>
@@ -4399,7 +4407,7 @@
           <p:nvPr/>
         </p:nvPicPr>
         <p:blipFill>
-          <a:blip r:embed="rId2"/>
+          <a:blip r:embed="rId2" cstate="print"/>
           <a:srcRect/>
           <a:stretch>
             <a:fillRect/>
@@ -4531,65 +4539,40 @@
           <a:p>
             <a:r>
               <a:rPr lang="en-US" dirty="0" smtClean="0"/>
-              <a:t>Questions for the Client</a:t>
+              <a:t>Main Page Screenshot</a:t>
             </a:r>
             <a:endParaRPr lang="en-US" dirty="0"/>
           </a:p>
         </p:txBody>
       </p:sp>
-      <p:sp>
-        <p:nvSpPr>
-          <p:cNvPr id="3" name="Content Placeholder 2"/>
-          <p:cNvSpPr>
-            <a:spLocks noGrp="1"/>
-          </p:cNvSpPr>
+      <p:pic>
+        <p:nvPicPr>
+          <p:cNvPr id="4" name="Content Placeholder 3" descr="MainPageSS.PNG"/>
+          <p:cNvPicPr>
+            <a:picLocks noGrp="1" noChangeAspect="1"/>
+          </p:cNvPicPr>
           <p:nvPr>
             <p:ph idx="1"/>
           </p:nvPr>
-        </p:nvSpPr>
-        <p:spPr/>
-        <p:txBody>
-          <a:bodyPr/>
-          <a:lstStyle/>
-          <a:p>
-            <a:r>
-              <a:rPr lang="en-US" dirty="0" smtClean="0"/>
-              <a:t>Error logging</a:t>
-            </a:r>
-          </a:p>
-          <a:p>
-            <a:r>
-              <a:rPr lang="en-US" dirty="0" smtClean="0"/>
-              <a:t>Color overlays</a:t>
-            </a:r>
-          </a:p>
-          <a:p>
-            <a:r>
-              <a:rPr lang="en-US" dirty="0" smtClean="0"/>
-              <a:t>Individual descriptions for table rows</a:t>
-            </a:r>
-          </a:p>
-          <a:p>
-            <a:r>
-              <a:rPr lang="en-US" dirty="0" smtClean="0"/>
-              <a:t>Support for multiple tables per connection</a:t>
-            </a:r>
-            <a:endParaRPr lang="en-US" dirty="0"/>
-          </a:p>
-        </p:txBody>
-      </p:sp>
+        </p:nvPicPr>
+        <p:blipFill>
+          <a:blip r:embed="rId2" cstate="print"/>
+          <a:stretch>
+            <a:fillRect/>
+          </a:stretch>
+        </p:blipFill>
+        <p:spPr>
+          <a:xfrm>
+            <a:off x="457200" y="1974599"/>
+            <a:ext cx="8229600" cy="4388352"/>
+          </a:xfrm>
+        </p:spPr>
+      </p:pic>
     </p:spTree>
   </p:cSld>
   <p:clrMapOvr>
     <a:masterClrMapping/>
   </p:clrMapOvr>
-  <p:timing>
-    <p:tnLst>
-      <p:par>
-        <p:cTn id="1" dur="indefinite" restart="never" nodeType="tmRoot"/>
-      </p:par>
-    </p:tnLst>
-  </p:timing>
 </p:sld>
 </file>
 
@@ -4627,61 +4610,40 @@
           <a:p>
             <a:r>
               <a:rPr lang="en-US" dirty="0" smtClean="0"/>
-              <a:t>Planned Work</a:t>
+              <a:t>Overall View of Create/Mod/View</a:t>
             </a:r>
             <a:endParaRPr lang="en-US" dirty="0"/>
           </a:p>
         </p:txBody>
       </p:sp>
-      <p:sp>
-        <p:nvSpPr>
-          <p:cNvPr id="3" name="Content Placeholder 2"/>
-          <p:cNvSpPr>
-            <a:spLocks noGrp="1"/>
-          </p:cNvSpPr>
+      <p:pic>
+        <p:nvPicPr>
+          <p:cNvPr id="4" name="Content Placeholder 3" descr="OverallSS.PNG"/>
+          <p:cNvPicPr>
+            <a:picLocks noGrp="1" noChangeAspect="1"/>
+          </p:cNvPicPr>
           <p:nvPr>
             <p:ph idx="1"/>
           </p:nvPr>
-        </p:nvSpPr>
-        <p:spPr/>
-        <p:txBody>
-          <a:bodyPr/>
-          <a:lstStyle/>
-          <a:p>
-            <a:r>
-              <a:rPr lang="en-US" dirty="0" smtClean="0"/>
-              <a:t>Software Architecture Document</a:t>
-            </a:r>
-          </a:p>
-          <a:p>
-            <a:r>
-              <a:rPr lang="en-US" dirty="0" smtClean="0"/>
-              <a:t>Interim Report</a:t>
-            </a:r>
-          </a:p>
-          <a:p>
-            <a:r>
-              <a:rPr lang="en-US" dirty="0" smtClean="0"/>
-              <a:t>Requirements Revision</a:t>
-            </a:r>
-          </a:p>
-          <a:p>
-            <a:endParaRPr lang="en-US" dirty="0"/>
-          </a:p>
-        </p:txBody>
-      </p:sp>
+        </p:nvPicPr>
+        <p:blipFill>
+          <a:blip r:embed="rId2" cstate="print"/>
+          <a:stretch>
+            <a:fillRect/>
+          </a:stretch>
+        </p:blipFill>
+        <p:spPr>
+          <a:xfrm>
+            <a:off x="457200" y="1963494"/>
+            <a:ext cx="8229600" cy="4410561"/>
+          </a:xfrm>
+        </p:spPr>
+      </p:pic>
     </p:spTree>
   </p:cSld>
   <p:clrMapOvr>
     <a:masterClrMapping/>
   </p:clrMapOvr>
-  <p:timing>
-    <p:tnLst>
-      <p:par>
-        <p:cTn id="1" dur="indefinite" restart="never" nodeType="tmRoot"/>
-      </p:par>
-    </p:tnLst>
-  </p:timing>
 </p:sld>
 </file>
 
@@ -4712,19 +4674,489 @@
             <p:ph type="title"/>
           </p:nvPr>
         </p:nvSpPr>
-        <p:spPr>
-          <a:xfrm>
-            <a:off x="457200" y="2895600"/>
-            <a:ext cx="6172200" cy="1143000"/>
-          </a:xfrm>
-        </p:spPr>
+        <p:spPr/>
         <p:txBody>
           <a:bodyPr/>
           <a:lstStyle/>
           <a:p>
             <a:r>
               <a:rPr lang="en-US" dirty="0" smtClean="0"/>
-              <a:t>Questions?</a:t>
+              <a:t>Conn/Database/</a:t>
+            </a:r>
+            <a:r>
+              <a:rPr lang="en-US" dirty="0" err="1" smtClean="0"/>
+              <a:t>Desc</a:t>
+            </a:r>
+            <a:r>
+              <a:rPr lang="en-US" dirty="0" smtClean="0"/>
+              <a:t> SS</a:t>
+            </a:r>
+            <a:endParaRPr lang="en-US" dirty="0"/>
+          </a:p>
+        </p:txBody>
+      </p:sp>
+      <p:pic>
+        <p:nvPicPr>
+          <p:cNvPr id="6" name="Content Placeholder 5" descr="ConnectionDatabaseDescSS.PNG"/>
+          <p:cNvPicPr>
+            <a:picLocks noGrp="1" noChangeAspect="1"/>
+          </p:cNvPicPr>
+          <p:nvPr>
+            <p:ph idx="1"/>
+          </p:nvPr>
+        </p:nvPicPr>
+        <p:blipFill>
+          <a:blip r:embed="rId2" cstate="print"/>
+          <a:stretch>
+            <a:fillRect/>
+          </a:stretch>
+        </p:blipFill>
+        <p:spPr>
+          <a:xfrm>
+            <a:off x="457200" y="1962752"/>
+            <a:ext cx="8229600" cy="4412045"/>
+          </a:xfrm>
+        </p:spPr>
+      </p:pic>
+    </p:spTree>
+  </p:cSld>
+  <p:clrMapOvr>
+    <a:masterClrMapping/>
+  </p:clrMapOvr>
+</p:sld>
+</file>
+
+<file path=ppt/slides/slide14.xml><?xml version="1.0" encoding="utf-8"?>
+<p:sld xmlns:a="http://schemas.openxmlformats.org/drawingml/2006/main" xmlns:r="http://schemas.openxmlformats.org/officeDocument/2006/relationships" xmlns:p="http://schemas.openxmlformats.org/presentationml/2006/main">
+  <p:cSld>
+    <p:spTree>
+      <p:nvGrpSpPr>
+        <p:cNvPr id="1" name=""/>
+        <p:cNvGrpSpPr/>
+        <p:nvPr/>
+      </p:nvGrpSpPr>
+      <p:grpSpPr>
+        <a:xfrm>
+          <a:off x="0" y="0"/>
+          <a:ext cx="0" cy="0"/>
+          <a:chOff x="0" y="0"/>
+          <a:chExt cx="0" cy="0"/>
+        </a:xfrm>
+      </p:grpSpPr>
+      <p:sp>
+        <p:nvSpPr>
+          <p:cNvPr id="2" name="Title 1"/>
+          <p:cNvSpPr>
+            <a:spLocks noGrp="1"/>
+          </p:cNvSpPr>
+          <p:nvPr>
+            <p:ph type="title"/>
+          </p:nvPr>
+        </p:nvSpPr>
+        <p:spPr/>
+        <p:txBody>
+          <a:bodyPr/>
+          <a:lstStyle/>
+          <a:p>
+            <a:r>
+              <a:rPr lang="en-US" dirty="0" smtClean="0"/>
+              <a:t>Overlay/Icon Screenshot	</a:t>
+            </a:r>
+            <a:endParaRPr lang="en-US" dirty="0"/>
+          </a:p>
+        </p:txBody>
+      </p:sp>
+      <p:pic>
+        <p:nvPicPr>
+          <p:cNvPr id="4" name="Content Placeholder 3" descr="IconOverlaySS.PNG"/>
+          <p:cNvPicPr>
+            <a:picLocks noGrp="1" noChangeAspect="1"/>
+          </p:cNvPicPr>
+          <p:nvPr>
+            <p:ph idx="1"/>
+          </p:nvPr>
+        </p:nvPicPr>
+        <p:blipFill>
+          <a:blip r:embed="rId2" cstate="print"/>
+          <a:stretch>
+            <a:fillRect/>
+          </a:stretch>
+        </p:blipFill>
+        <p:spPr>
+          <a:xfrm>
+            <a:off x="457200" y="1944402"/>
+            <a:ext cx="8229600" cy="4448746"/>
+          </a:xfrm>
+        </p:spPr>
+      </p:pic>
+    </p:spTree>
+  </p:cSld>
+  <p:clrMapOvr>
+    <a:masterClrMapping/>
+  </p:clrMapOvr>
+</p:sld>
+</file>
+
+<file path=ppt/slides/slide15.xml><?xml version="1.0" encoding="utf-8"?>
+<p:sld xmlns:a="http://schemas.openxmlformats.org/drawingml/2006/main" xmlns:r="http://schemas.openxmlformats.org/officeDocument/2006/relationships" xmlns:p="http://schemas.openxmlformats.org/presentationml/2006/main">
+  <p:cSld>
+    <p:spTree>
+      <p:nvGrpSpPr>
+        <p:cNvPr id="1" name=""/>
+        <p:cNvGrpSpPr/>
+        <p:nvPr/>
+      </p:nvGrpSpPr>
+      <p:grpSpPr>
+        <a:xfrm>
+          <a:off x="0" y="0"/>
+          <a:ext cx="0" cy="0"/>
+          <a:chOff x="0" y="0"/>
+          <a:chExt cx="0" cy="0"/>
+        </a:xfrm>
+      </p:grpSpPr>
+      <p:sp>
+        <p:nvSpPr>
+          <p:cNvPr id="2" name="Title 1"/>
+          <p:cNvSpPr>
+            <a:spLocks noGrp="1"/>
+          </p:cNvSpPr>
+          <p:nvPr>
+            <p:ph type="title"/>
+          </p:nvPr>
+        </p:nvSpPr>
+        <p:spPr/>
+        <p:txBody>
+          <a:bodyPr/>
+          <a:lstStyle/>
+          <a:p>
+            <a:r>
+              <a:rPr lang="en-US" dirty="0" smtClean="0"/>
+              <a:t>Icon Library</a:t>
+            </a:r>
+            <a:endParaRPr lang="en-US" dirty="0"/>
+          </a:p>
+        </p:txBody>
+      </p:sp>
+      <p:pic>
+        <p:nvPicPr>
+          <p:cNvPr id="4" name="Content Placeholder 3" descr="iconlibrarySS.PNG"/>
+          <p:cNvPicPr>
+            <a:picLocks noGrp="1" noChangeAspect="1"/>
+          </p:cNvPicPr>
+          <p:nvPr>
+            <p:ph idx="1"/>
+          </p:nvPr>
+        </p:nvPicPr>
+        <p:blipFill>
+          <a:blip r:embed="rId2" cstate="print"/>
+          <a:stretch>
+            <a:fillRect/>
+          </a:stretch>
+        </p:blipFill>
+        <p:spPr>
+          <a:xfrm>
+            <a:off x="457200" y="1940775"/>
+            <a:ext cx="8229600" cy="4455999"/>
+          </a:xfrm>
+        </p:spPr>
+      </p:pic>
+    </p:spTree>
+  </p:cSld>
+  <p:clrMapOvr>
+    <a:masterClrMapping/>
+  </p:clrMapOvr>
+</p:sld>
+</file>
+
+<file path=ppt/slides/slide16.xml><?xml version="1.0" encoding="utf-8"?>
+<p:sld xmlns:a="http://schemas.openxmlformats.org/drawingml/2006/main" xmlns:r="http://schemas.openxmlformats.org/officeDocument/2006/relationships" xmlns:p="http://schemas.openxmlformats.org/presentationml/2006/main">
+  <p:cSld>
+    <p:spTree>
+      <p:nvGrpSpPr>
+        <p:cNvPr id="1" name=""/>
+        <p:cNvGrpSpPr/>
+        <p:nvPr/>
+      </p:nvGrpSpPr>
+      <p:grpSpPr>
+        <a:xfrm>
+          <a:off x="0" y="0"/>
+          <a:ext cx="0" cy="0"/>
+          <a:chOff x="0" y="0"/>
+          <a:chExt cx="0" cy="0"/>
+        </a:xfrm>
+      </p:grpSpPr>
+      <p:sp>
+        <p:nvSpPr>
+          <p:cNvPr id="2" name="Title 1"/>
+          <p:cNvSpPr>
+            <a:spLocks noGrp="1"/>
+          </p:cNvSpPr>
+          <p:nvPr>
+            <p:ph type="title"/>
+          </p:nvPr>
+        </p:nvSpPr>
+        <p:spPr/>
+        <p:txBody>
+          <a:bodyPr/>
+          <a:lstStyle/>
+          <a:p>
+            <a:r>
+              <a:rPr lang="en-US" dirty="0" smtClean="0"/>
+              <a:t>Overlay Screenshot</a:t>
+            </a:r>
+            <a:endParaRPr lang="en-US" dirty="0"/>
+          </a:p>
+        </p:txBody>
+      </p:sp>
+      <p:pic>
+        <p:nvPicPr>
+          <p:cNvPr id="6" name="Content Placeholder 5" descr="OverlaySS.PNG"/>
+          <p:cNvPicPr>
+            <a:picLocks noGrp="1" noChangeAspect="1"/>
+          </p:cNvPicPr>
+          <p:nvPr>
+            <p:ph idx="1"/>
+          </p:nvPr>
+        </p:nvPicPr>
+        <p:blipFill>
+          <a:blip r:embed="rId2" cstate="print"/>
+          <a:stretch>
+            <a:fillRect/>
+          </a:stretch>
+        </p:blipFill>
+        <p:spPr>
+          <a:xfrm>
+            <a:off x="457200" y="1956017"/>
+            <a:ext cx="8229600" cy="4425516"/>
+          </a:xfrm>
+        </p:spPr>
+      </p:pic>
+    </p:spTree>
+  </p:cSld>
+  <p:clrMapOvr>
+    <a:masterClrMapping/>
+  </p:clrMapOvr>
+</p:sld>
+</file>
+
+<file path=ppt/slides/slide17.xml><?xml version="1.0" encoding="utf-8"?>
+<p:sld xmlns:a="http://schemas.openxmlformats.org/drawingml/2006/main" xmlns:r="http://schemas.openxmlformats.org/officeDocument/2006/relationships" xmlns:p="http://schemas.openxmlformats.org/presentationml/2006/main">
+  <p:cSld>
+    <p:spTree>
+      <p:nvGrpSpPr>
+        <p:cNvPr id="1" name=""/>
+        <p:cNvGrpSpPr/>
+        <p:nvPr/>
+      </p:nvGrpSpPr>
+      <p:grpSpPr>
+        <a:xfrm>
+          <a:off x="0" y="0"/>
+          <a:ext cx="0" cy="0"/>
+          <a:chOff x="0" y="0"/>
+          <a:chExt cx="0" cy="0"/>
+        </a:xfrm>
+      </p:grpSpPr>
+      <p:sp>
+        <p:nvSpPr>
+          <p:cNvPr id="2" name="Title 1"/>
+          <p:cNvSpPr>
+            <a:spLocks noGrp="1"/>
+          </p:cNvSpPr>
+          <p:nvPr>
+            <p:ph type="title"/>
+          </p:nvPr>
+        </p:nvSpPr>
+        <p:spPr/>
+        <p:txBody>
+          <a:bodyPr/>
+          <a:lstStyle/>
+          <a:p>
+            <a:r>
+              <a:rPr lang="en-US" dirty="0" smtClean="0"/>
+              <a:t>Modify Condition Screenshot</a:t>
+            </a:r>
+            <a:endParaRPr lang="en-US" dirty="0"/>
+          </a:p>
+        </p:txBody>
+      </p:sp>
+      <p:pic>
+        <p:nvPicPr>
+          <p:cNvPr id="4" name="Content Placeholder 3" descr="ModConditionSS.PNG"/>
+          <p:cNvPicPr>
+            <a:picLocks noGrp="1" noChangeAspect="1"/>
+          </p:cNvPicPr>
+          <p:nvPr>
+            <p:ph idx="1"/>
+          </p:nvPr>
+        </p:nvPicPr>
+        <p:blipFill>
+          <a:blip r:embed="rId2" cstate="print"/>
+          <a:stretch>
+            <a:fillRect/>
+          </a:stretch>
+        </p:blipFill>
+        <p:spPr>
+          <a:xfrm>
+            <a:off x="457200" y="1939439"/>
+            <a:ext cx="8229600" cy="4458672"/>
+          </a:xfrm>
+        </p:spPr>
+      </p:pic>
+    </p:spTree>
+  </p:cSld>
+  <p:clrMapOvr>
+    <a:masterClrMapping/>
+  </p:clrMapOvr>
+</p:sld>
+</file>
+
+<file path=ppt/slides/slide18.xml><?xml version="1.0" encoding="utf-8"?>
+<p:sld xmlns:a="http://schemas.openxmlformats.org/drawingml/2006/main" xmlns:r="http://schemas.openxmlformats.org/officeDocument/2006/relationships" xmlns:p="http://schemas.openxmlformats.org/presentationml/2006/main">
+  <p:cSld>
+    <p:spTree>
+      <p:nvGrpSpPr>
+        <p:cNvPr id="1" name=""/>
+        <p:cNvGrpSpPr/>
+        <p:nvPr/>
+      </p:nvGrpSpPr>
+      <p:grpSpPr>
+        <a:xfrm>
+          <a:off x="0" y="0"/>
+          <a:ext cx="0" cy="0"/>
+          <a:chOff x="0" y="0"/>
+          <a:chExt cx="0" cy="0"/>
+        </a:xfrm>
+      </p:grpSpPr>
+      <p:sp>
+        <p:nvSpPr>
+          <p:cNvPr id="2" name="Title 1"/>
+          <p:cNvSpPr>
+            <a:spLocks noGrp="1"/>
+          </p:cNvSpPr>
+          <p:nvPr>
+            <p:ph type="title"/>
+          </p:nvPr>
+        </p:nvSpPr>
+        <p:spPr/>
+        <p:txBody>
+          <a:bodyPr/>
+          <a:lstStyle/>
+          <a:p>
+            <a:r>
+              <a:rPr lang="en-US" dirty="0" smtClean="0"/>
+              <a:t>Upload Icon </a:t>
+            </a:r>
+            <a:endParaRPr lang="en-US" dirty="0"/>
+          </a:p>
+        </p:txBody>
+      </p:sp>
+      <p:pic>
+        <p:nvPicPr>
+          <p:cNvPr id="6" name="Content Placeholder 5" descr="UploadIconSS.PNG"/>
+          <p:cNvPicPr>
+            <a:picLocks noGrp="1" noChangeAspect="1"/>
+          </p:cNvPicPr>
+          <p:nvPr>
+            <p:ph idx="1"/>
+          </p:nvPr>
+        </p:nvPicPr>
+        <p:blipFill>
+          <a:blip r:embed="rId2" cstate="print"/>
+          <a:stretch>
+            <a:fillRect/>
+          </a:stretch>
+        </p:blipFill>
+        <p:spPr>
+          <a:xfrm>
+            <a:off x="457200" y="1929882"/>
+            <a:ext cx="8229600" cy="4477785"/>
+          </a:xfrm>
+        </p:spPr>
+      </p:pic>
+    </p:spTree>
+  </p:cSld>
+  <p:clrMapOvr>
+    <a:masterClrMapping/>
+  </p:clrMapOvr>
+</p:sld>
+</file>
+
+<file path=ppt/slides/slide19.xml><?xml version="1.0" encoding="utf-8"?>
+<p:sld xmlns:a="http://schemas.openxmlformats.org/drawingml/2006/main" xmlns:r="http://schemas.openxmlformats.org/officeDocument/2006/relationships" xmlns:p="http://schemas.openxmlformats.org/presentationml/2006/main">
+  <p:cSld>
+    <p:spTree>
+      <p:nvGrpSpPr>
+        <p:cNvPr id="1" name=""/>
+        <p:cNvGrpSpPr/>
+        <p:nvPr/>
+      </p:nvGrpSpPr>
+      <p:grpSpPr>
+        <a:xfrm>
+          <a:off x="0" y="0"/>
+          <a:ext cx="0" cy="0"/>
+          <a:chOff x="0" y="0"/>
+          <a:chExt cx="0" cy="0"/>
+        </a:xfrm>
+      </p:grpSpPr>
+      <p:sp>
+        <p:nvSpPr>
+          <p:cNvPr id="2" name="Title 1"/>
+          <p:cNvSpPr>
+            <a:spLocks noGrp="1"/>
+          </p:cNvSpPr>
+          <p:nvPr>
+            <p:ph type="title"/>
+          </p:nvPr>
+        </p:nvSpPr>
+        <p:spPr/>
+        <p:txBody>
+          <a:bodyPr/>
+          <a:lstStyle/>
+          <a:p>
+            <a:r>
+              <a:rPr lang="en-US" dirty="0" smtClean="0"/>
+              <a:t>Questions for the Client</a:t>
+            </a:r>
+            <a:endParaRPr lang="en-US" dirty="0"/>
+          </a:p>
+        </p:txBody>
+      </p:sp>
+      <p:sp>
+        <p:nvSpPr>
+          <p:cNvPr id="3" name="Content Placeholder 2"/>
+          <p:cNvSpPr>
+            <a:spLocks noGrp="1"/>
+          </p:cNvSpPr>
+          <p:nvPr>
+            <p:ph idx="1"/>
+          </p:nvPr>
+        </p:nvSpPr>
+        <p:spPr/>
+        <p:txBody>
+          <a:bodyPr/>
+          <a:lstStyle/>
+          <a:p>
+            <a:r>
+              <a:rPr lang="en-US" dirty="0" smtClean="0"/>
+              <a:t>Error logging</a:t>
+            </a:r>
+          </a:p>
+          <a:p>
+            <a:r>
+              <a:rPr lang="en-US" dirty="0" smtClean="0"/>
+              <a:t>Color overlays</a:t>
+            </a:r>
+          </a:p>
+          <a:p>
+            <a:r>
+              <a:rPr lang="en-US" dirty="0" smtClean="0"/>
+              <a:t>Individual descriptions for table rows</a:t>
+            </a:r>
+          </a:p>
+          <a:p>
+            <a:r>
+              <a:rPr lang="en-US" dirty="0" smtClean="0"/>
+              <a:t>Support for multiple tables per connection</a:t>
             </a:r>
             <a:endParaRPr lang="en-US" dirty="0"/>
           </a:p>
@@ -5010,6 +5442,158 @@
             </p:seq>
           </p:childTnLst>
         </p:cTn>
+      </p:par>
+    </p:tnLst>
+  </p:timing>
+</p:sld>
+</file>
+
+<file path=ppt/slides/slide20.xml><?xml version="1.0" encoding="utf-8"?>
+<p:sld xmlns:a="http://schemas.openxmlformats.org/drawingml/2006/main" xmlns:r="http://schemas.openxmlformats.org/officeDocument/2006/relationships" xmlns:p="http://schemas.openxmlformats.org/presentationml/2006/main">
+  <p:cSld>
+    <p:spTree>
+      <p:nvGrpSpPr>
+        <p:cNvPr id="1" name=""/>
+        <p:cNvGrpSpPr/>
+        <p:nvPr/>
+      </p:nvGrpSpPr>
+      <p:grpSpPr>
+        <a:xfrm>
+          <a:off x="0" y="0"/>
+          <a:ext cx="0" cy="0"/>
+          <a:chOff x="0" y="0"/>
+          <a:chExt cx="0" cy="0"/>
+        </a:xfrm>
+      </p:grpSpPr>
+      <p:sp>
+        <p:nvSpPr>
+          <p:cNvPr id="2" name="Title 1"/>
+          <p:cNvSpPr>
+            <a:spLocks noGrp="1"/>
+          </p:cNvSpPr>
+          <p:nvPr>
+            <p:ph type="title"/>
+          </p:nvPr>
+        </p:nvSpPr>
+        <p:spPr/>
+        <p:txBody>
+          <a:bodyPr/>
+          <a:lstStyle/>
+          <a:p>
+            <a:r>
+              <a:rPr lang="en-US" dirty="0" smtClean="0"/>
+              <a:t>Planned Work</a:t>
+            </a:r>
+            <a:endParaRPr lang="en-US" dirty="0"/>
+          </a:p>
+        </p:txBody>
+      </p:sp>
+      <p:sp>
+        <p:nvSpPr>
+          <p:cNvPr id="3" name="Content Placeholder 2"/>
+          <p:cNvSpPr>
+            <a:spLocks noGrp="1"/>
+          </p:cNvSpPr>
+          <p:nvPr>
+            <p:ph idx="1"/>
+          </p:nvPr>
+        </p:nvSpPr>
+        <p:spPr/>
+        <p:txBody>
+          <a:bodyPr/>
+          <a:lstStyle/>
+          <a:p>
+            <a:r>
+              <a:rPr lang="en-US" dirty="0" smtClean="0"/>
+              <a:t>Software Architecture Document</a:t>
+            </a:r>
+          </a:p>
+          <a:p>
+            <a:r>
+              <a:rPr lang="en-US" dirty="0" smtClean="0"/>
+              <a:t>Interim Report</a:t>
+            </a:r>
+          </a:p>
+          <a:p>
+            <a:r>
+              <a:rPr lang="en-US" dirty="0" smtClean="0"/>
+              <a:t>Requirements Revision</a:t>
+            </a:r>
+          </a:p>
+          <a:p>
+            <a:endParaRPr lang="en-US" dirty="0"/>
+          </a:p>
+        </p:txBody>
+      </p:sp>
+    </p:spTree>
+  </p:cSld>
+  <p:clrMapOvr>
+    <a:masterClrMapping/>
+  </p:clrMapOvr>
+  <p:timing>
+    <p:tnLst>
+      <p:par>
+        <p:cTn id="1" dur="indefinite" restart="never" nodeType="tmRoot"/>
+      </p:par>
+    </p:tnLst>
+  </p:timing>
+</p:sld>
+</file>
+
+<file path=ppt/slides/slide21.xml><?xml version="1.0" encoding="utf-8"?>
+<p:sld xmlns:a="http://schemas.openxmlformats.org/drawingml/2006/main" xmlns:r="http://schemas.openxmlformats.org/officeDocument/2006/relationships" xmlns:p="http://schemas.openxmlformats.org/presentationml/2006/main">
+  <p:cSld>
+    <p:spTree>
+      <p:nvGrpSpPr>
+        <p:cNvPr id="1" name=""/>
+        <p:cNvGrpSpPr/>
+        <p:nvPr/>
+      </p:nvGrpSpPr>
+      <p:grpSpPr>
+        <a:xfrm>
+          <a:off x="0" y="0"/>
+          <a:ext cx="0" cy="0"/>
+          <a:chOff x="0" y="0"/>
+          <a:chExt cx="0" cy="0"/>
+        </a:xfrm>
+      </p:grpSpPr>
+      <p:sp>
+        <p:nvSpPr>
+          <p:cNvPr id="2" name="Title 1"/>
+          <p:cNvSpPr>
+            <a:spLocks noGrp="1"/>
+          </p:cNvSpPr>
+          <p:nvPr>
+            <p:ph type="title"/>
+          </p:nvPr>
+        </p:nvSpPr>
+        <p:spPr>
+          <a:xfrm>
+            <a:off x="457200" y="2895600"/>
+            <a:ext cx="6172200" cy="1143000"/>
+          </a:xfrm>
+        </p:spPr>
+        <p:txBody>
+          <a:bodyPr/>
+          <a:lstStyle/>
+          <a:p>
+            <a:r>
+              <a:rPr lang="en-US" dirty="0" smtClean="0"/>
+              <a:t>Questions?</a:t>
+            </a:r>
+            <a:endParaRPr lang="en-US" dirty="0"/>
+          </a:p>
+        </p:txBody>
+      </p:sp>
+    </p:spTree>
+  </p:cSld>
+  <p:clrMapOvr>
+    <a:masterClrMapping/>
+  </p:clrMapOvr>
+  <p:timing>
+    <p:tnLst>
+      <p:par>
+        <p:cTn id="1" dur="indefinite" restart="never" nodeType="tmRoot"/>
       </p:par>
     </p:tnLst>
   </p:timing>

</xml_diff>

<commit_message>
Updated the slide titles
</commit_message>
<xml_diff>
--- a/docs/ODBC2KML Requrements Meeting.pptx
+++ b/docs/ODBC2KML Requrements Meeting.pptx
@@ -1,6 +1,6 @@
 
 <file path=ppt/presentation.xml><?xml version="1.0" encoding="utf-8"?>
-<p:presentation xmlns:a="http://schemas.openxmlformats.org/drawingml/2006/main" xmlns:r="http://schemas.openxmlformats.org/officeDocument/2006/relationships" xmlns:p="http://schemas.openxmlformats.org/presentationml/2006/main" saveSubsetFonts="1">
+<p:presentation xmlns:a="http://schemas.openxmlformats.org/drawingml/2006/main" xmlns:r="http://schemas.openxmlformats.org/officeDocument/2006/relationships" xmlns:mc="http://schemas.openxmlformats.org/markup-compatibility/2006" xmlns:mv="urn:schemas-microsoft-com:mac:vml" xmlns:p="http://schemas.openxmlformats.org/presentationml/2006/main" mc:Ignorable="mv" mc:PreserveAttributes="mv:*" saveSubsetFonts="1">
   <p:sldMasterIdLst>
     <p:sldMasterId id="2147483744" r:id="rId1"/>
   </p:sldMasterIdLst>
@@ -131,7 +131,7 @@
 </file>
 
 <file path=ppt/notesMasters/notesMaster1.xml><?xml version="1.0" encoding="utf-8"?>
-<p:notesMaster xmlns:a="http://schemas.openxmlformats.org/drawingml/2006/main" xmlns:r="http://schemas.openxmlformats.org/officeDocument/2006/relationships" xmlns:p="http://schemas.openxmlformats.org/presentationml/2006/main">
+<p:notesMaster xmlns:a="http://schemas.openxmlformats.org/drawingml/2006/main" xmlns:r="http://schemas.openxmlformats.org/officeDocument/2006/relationships" xmlns:mc="http://schemas.openxmlformats.org/markup-compatibility/2006" xmlns:mv="urn:schemas-microsoft-com:mac:vml" xmlns:p="http://schemas.openxmlformats.org/presentationml/2006/main" mc:Ignorable="mv" mc:PreserveAttributes="mv:*">
   <p:cSld>
     <p:bg>
       <p:bgRef idx="1001">
@@ -213,7 +213,7 @@
             <a:fld id="{85A68EFB-1316-444C-A87F-A3B405362BF0}" type="datetimeFigureOut">
               <a:rPr lang="en-US" smtClean="0"/>
               <a:pPr/>
-              <a:t>11/5/2009</a:t>
+              <a:t>11/10/09</a:t>
             </a:fld>
             <a:endParaRPr lang="en-US"/>
           </a:p>
@@ -480,7 +480,7 @@
 </file>
 
 <file path=ppt/notesSlides/notesSlide1.xml><?xml version="1.0" encoding="utf-8"?>
-<p:notes xmlns:a="http://schemas.openxmlformats.org/drawingml/2006/main" xmlns:r="http://schemas.openxmlformats.org/officeDocument/2006/relationships" xmlns:p="http://schemas.openxmlformats.org/presentationml/2006/main">
+<p:notes xmlns:a="http://schemas.openxmlformats.org/drawingml/2006/main" xmlns:r="http://schemas.openxmlformats.org/officeDocument/2006/relationships" xmlns:mc="http://schemas.openxmlformats.org/markup-compatibility/2006" xmlns:mv="urn:schemas-microsoft-com:mac:vml" xmlns:p="http://schemas.openxmlformats.org/presentationml/2006/main" mc:Ignorable="mv" mc:PreserveAttributes="mv:*">
   <p:cSld>
     <p:bg>
       <p:bgPr>
@@ -603,7 +603,7 @@
 </file>
 
 <file path=ppt/notesSlides/notesSlide2.xml><?xml version="1.0" encoding="utf-8"?>
-<p:notes xmlns:a="http://schemas.openxmlformats.org/drawingml/2006/main" xmlns:r="http://schemas.openxmlformats.org/officeDocument/2006/relationships" xmlns:p="http://schemas.openxmlformats.org/presentationml/2006/main">
+<p:notes xmlns:a="http://schemas.openxmlformats.org/drawingml/2006/main" xmlns:r="http://schemas.openxmlformats.org/officeDocument/2006/relationships" xmlns:mc="http://schemas.openxmlformats.org/markup-compatibility/2006" xmlns:mv="urn:schemas-microsoft-com:mac:vml" xmlns:p="http://schemas.openxmlformats.org/presentationml/2006/main" mc:Ignorable="mv" mc:PreserveAttributes="mv:*">
   <p:cSld>
     <p:bg>
       <p:bgPr>
@@ -726,7 +726,7 @@
 </file>
 
 <file path=ppt/notesSlides/notesSlide3.xml><?xml version="1.0" encoding="utf-8"?>
-<p:notes xmlns:a="http://schemas.openxmlformats.org/drawingml/2006/main" xmlns:r="http://schemas.openxmlformats.org/officeDocument/2006/relationships" xmlns:p="http://schemas.openxmlformats.org/presentationml/2006/main">
+<p:notes xmlns:a="http://schemas.openxmlformats.org/drawingml/2006/main" xmlns:r="http://schemas.openxmlformats.org/officeDocument/2006/relationships" xmlns:mc="http://schemas.openxmlformats.org/markup-compatibility/2006" xmlns:mv="urn:schemas-microsoft-com:mac:vml" xmlns:p="http://schemas.openxmlformats.org/presentationml/2006/main" mc:Ignorable="mv" mc:PreserveAttributes="mv:*">
   <p:cSld>
     <p:bg>
       <p:bgPr>
@@ -849,7 +849,7 @@
 </file>
 
 <file path=ppt/slideLayouts/slideLayout1.xml><?xml version="1.0" encoding="utf-8"?>
-<p:sldLayout xmlns:a="http://schemas.openxmlformats.org/drawingml/2006/main" xmlns:r="http://schemas.openxmlformats.org/officeDocument/2006/relationships" xmlns:p="http://schemas.openxmlformats.org/presentationml/2006/main" type="title" preserve="1">
+<p:sldLayout xmlns:a="http://schemas.openxmlformats.org/drawingml/2006/main" xmlns:r="http://schemas.openxmlformats.org/officeDocument/2006/relationships" xmlns:mc="http://schemas.openxmlformats.org/markup-compatibility/2006" xmlns:mv="urn:schemas-microsoft-com:mac:vml" xmlns:p="http://schemas.openxmlformats.org/presentationml/2006/main" mc:Ignorable="mv" mc:PreserveAttributes="mv:*" type="title" preserve="1">
   <p:cSld name="Title Slide">
     <p:spTree>
       <p:nvGrpSpPr>
@@ -1068,7 +1068,7 @@
             <a:fld id="{EDEB2150-E434-4AFF-A209-1B6D19CA9216}" type="datetimeFigureOut">
               <a:rPr lang="en-US" smtClean="0"/>
               <a:pPr/>
-              <a:t>11/5/2009</a:t>
+              <a:t>11/10/09</a:t>
             </a:fld>
             <a:endParaRPr lang="en-US"/>
           </a:p>
@@ -1148,7 +1148,7 @@
 </file>
 
 <file path=ppt/slideLayouts/slideLayout10.xml><?xml version="1.0" encoding="utf-8"?>
-<p:sldLayout xmlns:a="http://schemas.openxmlformats.org/drawingml/2006/main" xmlns:r="http://schemas.openxmlformats.org/officeDocument/2006/relationships" xmlns:p="http://schemas.openxmlformats.org/presentationml/2006/main" type="vertTx" preserve="1">
+<p:sldLayout xmlns:a="http://schemas.openxmlformats.org/drawingml/2006/main" xmlns:r="http://schemas.openxmlformats.org/officeDocument/2006/relationships" xmlns:mc="http://schemas.openxmlformats.org/markup-compatibility/2006" xmlns:mv="urn:schemas-microsoft-com:mac:vml" xmlns:p="http://schemas.openxmlformats.org/presentationml/2006/main" mc:Ignorable="mv" mc:PreserveAttributes="mv:*" type="vertTx" preserve="1">
   <p:cSld name="Title and Vertical Text">
     <p:spTree>
       <p:nvGrpSpPr>
@@ -1257,7 +1257,7 @@
             <a:fld id="{EDEB2150-E434-4AFF-A209-1B6D19CA9216}" type="datetimeFigureOut">
               <a:rPr lang="en-US" smtClean="0"/>
               <a:pPr/>
-              <a:t>11/5/2009</a:t>
+              <a:t>11/10/09</a:t>
             </a:fld>
             <a:endParaRPr lang="en-US"/>
           </a:p>
@@ -1315,7 +1315,7 @@
 </file>
 
 <file path=ppt/slideLayouts/slideLayout11.xml><?xml version="1.0" encoding="utf-8"?>
-<p:sldLayout xmlns:a="http://schemas.openxmlformats.org/drawingml/2006/main" xmlns:r="http://schemas.openxmlformats.org/officeDocument/2006/relationships" xmlns:p="http://schemas.openxmlformats.org/presentationml/2006/main" type="vertTitleAndTx" preserve="1">
+<p:sldLayout xmlns:a="http://schemas.openxmlformats.org/drawingml/2006/main" xmlns:r="http://schemas.openxmlformats.org/officeDocument/2006/relationships" xmlns:mc="http://schemas.openxmlformats.org/markup-compatibility/2006" xmlns:mv="urn:schemas-microsoft-com:mac:vml" xmlns:p="http://schemas.openxmlformats.org/presentationml/2006/main" mc:Ignorable="mv" mc:PreserveAttributes="mv:*" type="vertTitleAndTx" preserve="1">
   <p:cSld name="Vertical Title and Text">
     <p:spTree>
       <p:nvGrpSpPr>
@@ -1434,7 +1434,7 @@
             <a:fld id="{EDEB2150-E434-4AFF-A209-1B6D19CA9216}" type="datetimeFigureOut">
               <a:rPr lang="en-US" smtClean="0"/>
               <a:pPr/>
-              <a:t>11/5/2009</a:t>
+              <a:t>11/10/09</a:t>
             </a:fld>
             <a:endParaRPr lang="en-US"/>
           </a:p>
@@ -1492,7 +1492,7 @@
 </file>
 
 <file path=ppt/slideLayouts/slideLayout2.xml><?xml version="1.0" encoding="utf-8"?>
-<p:sldLayout xmlns:a="http://schemas.openxmlformats.org/drawingml/2006/main" xmlns:r="http://schemas.openxmlformats.org/officeDocument/2006/relationships" xmlns:p="http://schemas.openxmlformats.org/presentationml/2006/main" type="obj" preserve="1">
+<p:sldLayout xmlns:a="http://schemas.openxmlformats.org/drawingml/2006/main" xmlns:r="http://schemas.openxmlformats.org/officeDocument/2006/relationships" xmlns:mc="http://schemas.openxmlformats.org/markup-compatibility/2006" xmlns:mv="urn:schemas-microsoft-com:mac:vml" xmlns:p="http://schemas.openxmlformats.org/presentationml/2006/main" mc:Ignorable="mv" mc:PreserveAttributes="mv:*" type="obj" preserve="1">
   <p:cSld name="Title and Content">
     <p:spTree>
       <p:nvGrpSpPr>
@@ -1616,7 +1616,7 @@
             <a:fld id="{EDEB2150-E434-4AFF-A209-1B6D19CA9216}" type="datetimeFigureOut">
               <a:rPr lang="en-US" smtClean="0"/>
               <a:pPr/>
-              <a:t>11/5/2009</a:t>
+              <a:t>11/10/09</a:t>
             </a:fld>
             <a:endParaRPr lang="en-US"/>
           </a:p>
@@ -1679,7 +1679,7 @@
 </file>
 
 <file path=ppt/slideLayouts/slideLayout3.xml><?xml version="1.0" encoding="utf-8"?>
-<p:sldLayout xmlns:a="http://schemas.openxmlformats.org/drawingml/2006/main" xmlns:r="http://schemas.openxmlformats.org/officeDocument/2006/relationships" xmlns:p="http://schemas.openxmlformats.org/presentationml/2006/main" showMasterSp="0" type="secHead" preserve="1">
+<p:sldLayout xmlns:a="http://schemas.openxmlformats.org/drawingml/2006/main" xmlns:r="http://schemas.openxmlformats.org/officeDocument/2006/relationships" xmlns:mc="http://schemas.openxmlformats.org/markup-compatibility/2006" xmlns:mv="urn:schemas-microsoft-com:mac:vml" xmlns:p="http://schemas.openxmlformats.org/presentationml/2006/main" mc:Ignorable="mv" mc:PreserveAttributes="mv:*" showMasterSp="0" type="secHead" preserve="1">
   <p:cSld name="Section Header">
     <p:bg>
       <p:bgRef idx="1002">
@@ -1865,7 +1865,7 @@
             <a:fld id="{EDEB2150-E434-4AFF-A209-1B6D19CA9216}" type="datetimeFigureOut">
               <a:rPr lang="en-US" smtClean="0"/>
               <a:pPr/>
-              <a:t>11/5/2009</a:t>
+              <a:t>11/10/09</a:t>
             </a:fld>
             <a:endParaRPr lang="en-US"/>
           </a:p>
@@ -2129,7 +2129,7 @@
 </file>
 
 <file path=ppt/slideLayouts/slideLayout4.xml><?xml version="1.0" encoding="utf-8"?>
-<p:sldLayout xmlns:a="http://schemas.openxmlformats.org/drawingml/2006/main" xmlns:r="http://schemas.openxmlformats.org/officeDocument/2006/relationships" xmlns:p="http://schemas.openxmlformats.org/presentationml/2006/main" type="twoObj" preserve="1">
+<p:sldLayout xmlns:a="http://schemas.openxmlformats.org/drawingml/2006/main" xmlns:r="http://schemas.openxmlformats.org/officeDocument/2006/relationships" xmlns:mc="http://schemas.openxmlformats.org/markup-compatibility/2006" xmlns:mv="urn:schemas-microsoft-com:mac:vml" xmlns:p="http://schemas.openxmlformats.org/presentationml/2006/main" mc:Ignorable="mv" mc:PreserveAttributes="mv:*" type="twoObj" preserve="1">
   <p:cSld name="Two Content">
     <p:spTree>
       <p:nvGrpSpPr>
@@ -2341,7 +2341,7 @@
             <a:fld id="{EDEB2150-E434-4AFF-A209-1B6D19CA9216}" type="datetimeFigureOut">
               <a:rPr lang="en-US" smtClean="0"/>
               <a:pPr/>
-              <a:t>11/5/2009</a:t>
+              <a:t>11/10/09</a:t>
             </a:fld>
             <a:endParaRPr lang="en-US"/>
           </a:p>
@@ -2409,7 +2409,7 @@
 </file>
 
 <file path=ppt/slideLayouts/slideLayout5.xml><?xml version="1.0" encoding="utf-8"?>
-<p:sldLayout xmlns:a="http://schemas.openxmlformats.org/drawingml/2006/main" xmlns:r="http://schemas.openxmlformats.org/officeDocument/2006/relationships" xmlns:p="http://schemas.openxmlformats.org/presentationml/2006/main" showMasterSp="0" type="twoTxTwoObj" preserve="1">
+<p:sldLayout xmlns:a="http://schemas.openxmlformats.org/drawingml/2006/main" xmlns:r="http://schemas.openxmlformats.org/officeDocument/2006/relationships" xmlns:mc="http://schemas.openxmlformats.org/markup-compatibility/2006" xmlns:mv="urn:schemas-microsoft-com:mac:vml" xmlns:p="http://schemas.openxmlformats.org/presentationml/2006/main" mc:Ignorable="mv" mc:PreserveAttributes="mv:*" showMasterSp="0" type="twoTxTwoObj" preserve="1">
   <p:cSld name="Comparison">
     <p:bg>
       <p:bgRef idx="1002">
@@ -2758,7 +2758,7 @@
             <a:fld id="{EDEB2150-E434-4AFF-A209-1B6D19CA9216}" type="datetimeFigureOut">
               <a:rPr lang="en-US" smtClean="0"/>
               <a:pPr/>
-              <a:t>11/5/2009</a:t>
+              <a:t>11/10/09</a:t>
             </a:fld>
             <a:endParaRPr lang="en-US"/>
           </a:p>
@@ -2830,7 +2830,7 @@
 </file>
 
 <file path=ppt/slideLayouts/slideLayout6.xml><?xml version="1.0" encoding="utf-8"?>
-<p:sldLayout xmlns:a="http://schemas.openxmlformats.org/drawingml/2006/main" xmlns:r="http://schemas.openxmlformats.org/officeDocument/2006/relationships" xmlns:p="http://schemas.openxmlformats.org/presentationml/2006/main" type="titleOnly" preserve="1">
+<p:sldLayout xmlns:a="http://schemas.openxmlformats.org/drawingml/2006/main" xmlns:r="http://schemas.openxmlformats.org/officeDocument/2006/relationships" xmlns:mc="http://schemas.openxmlformats.org/markup-compatibility/2006" xmlns:mv="urn:schemas-microsoft-com:mac:vml" xmlns:p="http://schemas.openxmlformats.org/presentationml/2006/main" mc:Ignorable="mv" mc:PreserveAttributes="mv:*" type="titleOnly" preserve="1">
   <p:cSld name="Title Only">
     <p:spTree>
       <p:nvGrpSpPr>
@@ -2891,7 +2891,7 @@
             <a:fld id="{EDEB2150-E434-4AFF-A209-1B6D19CA9216}" type="datetimeFigureOut">
               <a:rPr lang="en-US" smtClean="0"/>
               <a:pPr/>
-              <a:t>11/5/2009</a:t>
+              <a:t>11/10/09</a:t>
             </a:fld>
             <a:endParaRPr lang="en-US"/>
           </a:p>
@@ -2949,7 +2949,7 @@
 </file>
 
 <file path=ppt/slideLayouts/slideLayout7.xml><?xml version="1.0" encoding="utf-8"?>
-<p:sldLayout xmlns:a="http://schemas.openxmlformats.org/drawingml/2006/main" xmlns:r="http://schemas.openxmlformats.org/officeDocument/2006/relationships" xmlns:p="http://schemas.openxmlformats.org/presentationml/2006/main" type="blank" preserve="1">
+<p:sldLayout xmlns:a="http://schemas.openxmlformats.org/drawingml/2006/main" xmlns:r="http://schemas.openxmlformats.org/officeDocument/2006/relationships" xmlns:mc="http://schemas.openxmlformats.org/markup-compatibility/2006" xmlns:mv="urn:schemas-microsoft-com:mac:vml" xmlns:p="http://schemas.openxmlformats.org/presentationml/2006/main" mc:Ignorable="mv" mc:PreserveAttributes="mv:*" type="blank" preserve="1">
   <p:cSld name="Blank">
     <p:spTree>
       <p:nvGrpSpPr>
@@ -2988,7 +2988,7 @@
             <a:fld id="{EDEB2150-E434-4AFF-A209-1B6D19CA9216}" type="datetimeFigureOut">
               <a:rPr lang="en-US" smtClean="0"/>
               <a:pPr/>
-              <a:t>11/5/2009</a:t>
+              <a:t>11/10/09</a:t>
             </a:fld>
             <a:endParaRPr lang="en-US"/>
           </a:p>
@@ -3056,7 +3056,7 @@
 </file>
 
 <file path=ppt/slideLayouts/slideLayout8.xml><?xml version="1.0" encoding="utf-8"?>
-<p:sldLayout xmlns:a="http://schemas.openxmlformats.org/drawingml/2006/main" xmlns:r="http://schemas.openxmlformats.org/officeDocument/2006/relationships" xmlns:p="http://schemas.openxmlformats.org/presentationml/2006/main" showMasterSp="0" type="objTx" preserve="1">
+<p:sldLayout xmlns:a="http://schemas.openxmlformats.org/drawingml/2006/main" xmlns:r="http://schemas.openxmlformats.org/officeDocument/2006/relationships" xmlns:mc="http://schemas.openxmlformats.org/markup-compatibility/2006" xmlns:mv="urn:schemas-microsoft-com:mac:vml" xmlns:p="http://schemas.openxmlformats.org/presentationml/2006/main" mc:Ignorable="mv" mc:PreserveAttributes="mv:*" showMasterSp="0" type="objTx" preserve="1">
   <p:cSld name="Content with Caption">
     <p:bg>
       <p:bgRef idx="1002">
@@ -3268,7 +3268,7 @@
             <a:fld id="{EDEB2150-E434-4AFF-A209-1B6D19CA9216}" type="datetimeFigureOut">
               <a:rPr lang="en-US" smtClean="0"/>
               <a:pPr/>
-              <a:t>11/5/2009</a:t>
+              <a:t>11/10/09</a:t>
             </a:fld>
             <a:endParaRPr lang="en-US"/>
           </a:p>
@@ -3344,7 +3344,7 @@
 </file>
 
 <file path=ppt/slideLayouts/slideLayout9.xml><?xml version="1.0" encoding="utf-8"?>
-<p:sldLayout xmlns:a="http://schemas.openxmlformats.org/drawingml/2006/main" xmlns:r="http://schemas.openxmlformats.org/officeDocument/2006/relationships" xmlns:p="http://schemas.openxmlformats.org/presentationml/2006/main" showMasterSp="0" type="picTx" preserve="1">
+<p:sldLayout xmlns:a="http://schemas.openxmlformats.org/drawingml/2006/main" xmlns:r="http://schemas.openxmlformats.org/officeDocument/2006/relationships" xmlns:mc="http://schemas.openxmlformats.org/markup-compatibility/2006" xmlns:mv="urn:schemas-microsoft-com:mac:vml" xmlns:p="http://schemas.openxmlformats.org/presentationml/2006/main" mc:Ignorable="mv" mc:PreserveAttributes="mv:*" showMasterSp="0" type="picTx" preserve="1">
   <p:cSld name="Picture with Caption">
     <p:bg>
       <p:bgRef idx="1002">
@@ -3522,7 +3522,7 @@
             <a:fld id="{EDEB2150-E434-4AFF-A209-1B6D19CA9216}" type="datetimeFigureOut">
               <a:rPr lang="en-US" smtClean="0"/>
               <a:pPr/>
-              <a:t>11/5/2009</a:t>
+              <a:t>11/10/09</a:t>
             </a:fld>
             <a:endParaRPr lang="en-US"/>
           </a:p>
@@ -3598,7 +3598,7 @@
 </file>
 
 <file path=ppt/slideMasters/slideMaster1.xml><?xml version="1.0" encoding="utf-8"?>
-<p:sldMaster xmlns:a="http://schemas.openxmlformats.org/drawingml/2006/main" xmlns:r="http://schemas.openxmlformats.org/officeDocument/2006/relationships" xmlns:p="http://schemas.openxmlformats.org/presentationml/2006/main">
+<p:sldMaster xmlns:a="http://schemas.openxmlformats.org/drawingml/2006/main" xmlns:r="http://schemas.openxmlformats.org/officeDocument/2006/relationships" xmlns:mc="http://schemas.openxmlformats.org/markup-compatibility/2006" xmlns:mv="urn:schemas-microsoft-com:mac:vml" xmlns:p="http://schemas.openxmlformats.org/presentationml/2006/main" mc:Ignorable="mv" mc:PreserveAttributes="mv:*">
   <p:cSld>
     <p:bg>
       <p:bgRef idx="1002">
@@ -3896,7 +3896,7 @@
             <a:fld id="{EDEB2150-E434-4AFF-A209-1B6D19CA9216}" type="datetimeFigureOut">
               <a:rPr lang="en-US" smtClean="0"/>
               <a:pPr/>
-              <a:t>11/5/2009</a:t>
+              <a:t>11/10/09</a:t>
             </a:fld>
             <a:endParaRPr lang="en-US"/>
           </a:p>
@@ -4300,7 +4300,7 @@
 </file>
 
 <file path=ppt/slides/slide1.xml><?xml version="1.0" encoding="utf-8"?>
-<p:sld xmlns:a="http://schemas.openxmlformats.org/drawingml/2006/main" xmlns:r="http://schemas.openxmlformats.org/officeDocument/2006/relationships" xmlns:p="http://schemas.openxmlformats.org/presentationml/2006/main">
+<p:sld xmlns:a="http://schemas.openxmlformats.org/drawingml/2006/main" xmlns:r="http://schemas.openxmlformats.org/officeDocument/2006/relationships" xmlns:mc="http://schemas.openxmlformats.org/markup-compatibility/2006" xmlns:mv="urn:schemas-microsoft-com:mac:vml" xmlns:p="http://schemas.openxmlformats.org/presentationml/2006/main" mc:Ignorable="mv" mc:PreserveAttributes="mv:*">
   <p:cSld>
     <p:spTree>
       <p:nvGrpSpPr>
@@ -4446,7 +4446,7 @@
 </file>
 
 <file path=ppt/slides/slide10.xml><?xml version="1.0" encoding="utf-8"?>
-<p:sld xmlns:a="http://schemas.openxmlformats.org/drawingml/2006/main" xmlns:r="http://schemas.openxmlformats.org/officeDocument/2006/relationships" xmlns:p="http://schemas.openxmlformats.org/presentationml/2006/main">
+<p:sld xmlns:a="http://schemas.openxmlformats.org/drawingml/2006/main" xmlns:r="http://schemas.openxmlformats.org/officeDocument/2006/relationships" xmlns:mc="http://schemas.openxmlformats.org/markup-compatibility/2006" xmlns:mv="urn:schemas-microsoft-com:mac:vml" xmlns:p="http://schemas.openxmlformats.org/presentationml/2006/main" mc:Ignorable="mv" mc:PreserveAttributes="mv:*">
   <p:cSld>
     <p:spTree>
       <p:nvGrpSpPr>
@@ -4506,7 +4506,7 @@
 </file>
 
 <file path=ppt/slides/slide11.xml><?xml version="1.0" encoding="utf-8"?>
-<p:sld xmlns:a="http://schemas.openxmlformats.org/drawingml/2006/main" xmlns:r="http://schemas.openxmlformats.org/officeDocument/2006/relationships" xmlns:p="http://schemas.openxmlformats.org/presentationml/2006/main">
+<p:sld xmlns:a="http://schemas.openxmlformats.org/drawingml/2006/main" xmlns:r="http://schemas.openxmlformats.org/officeDocument/2006/relationships" xmlns:mc="http://schemas.openxmlformats.org/markup-compatibility/2006" xmlns:mv="urn:schemas-microsoft-com:mac:vml" xmlns:p="http://schemas.openxmlformats.org/presentationml/2006/main" mc:Ignorable="mv" mc:PreserveAttributes="mv:*">
   <p:cSld>
     <p:spTree>
       <p:nvGrpSpPr>
@@ -4577,7 +4577,7 @@
 </file>
 
 <file path=ppt/slides/slide12.xml><?xml version="1.0" encoding="utf-8"?>
-<p:sld xmlns:a="http://schemas.openxmlformats.org/drawingml/2006/main" xmlns:r="http://schemas.openxmlformats.org/officeDocument/2006/relationships" xmlns:p="http://schemas.openxmlformats.org/presentationml/2006/main">
+<p:sld xmlns:a="http://schemas.openxmlformats.org/drawingml/2006/main" xmlns:r="http://schemas.openxmlformats.org/officeDocument/2006/relationships" xmlns:mc="http://schemas.openxmlformats.org/markup-compatibility/2006" xmlns:mv="urn:schemas-microsoft-com:mac:vml" xmlns:p="http://schemas.openxmlformats.org/presentationml/2006/main" mc:Ignorable="mv" mc:PreserveAttributes="mv:*">
   <p:cSld>
     <p:spTree>
       <p:nvGrpSpPr>
@@ -4610,7 +4610,15 @@
           <a:p>
             <a:r>
               <a:rPr lang="en-US" dirty="0" smtClean="0"/>
-              <a:t>Overall View of Create/Mod/View</a:t>
+              <a:t>Overall View of Create/</a:t>
+            </a:r>
+            <a:r>
+              <a:rPr lang="en-US" dirty="0" smtClean="0"/>
+              <a:t>Modify/</a:t>
+            </a:r>
+            <a:r>
+              <a:rPr lang="en-US" dirty="0" smtClean="0"/>
+              <a:t>View</a:t>
             </a:r>
             <a:endParaRPr lang="en-US" dirty="0"/>
           </a:p>
@@ -4648,7 +4656,7 @@
 </file>
 
 <file path=ppt/slides/slide13.xml><?xml version="1.0" encoding="utf-8"?>
-<p:sld xmlns:a="http://schemas.openxmlformats.org/drawingml/2006/main" xmlns:r="http://schemas.openxmlformats.org/officeDocument/2006/relationships" xmlns:p="http://schemas.openxmlformats.org/presentationml/2006/main">
+<p:sld xmlns:a="http://schemas.openxmlformats.org/drawingml/2006/main" xmlns:r="http://schemas.openxmlformats.org/officeDocument/2006/relationships" xmlns:mc="http://schemas.openxmlformats.org/markup-compatibility/2006" xmlns:mv="urn:schemas-microsoft-com:mac:vml" xmlns:p="http://schemas.openxmlformats.org/presentationml/2006/main" mc:Ignorable="mv" mc:PreserveAttributes="mv:*">
   <p:cSld>
     <p:spTree>
       <p:nvGrpSpPr>
@@ -4681,15 +4689,15 @@
           <a:p>
             <a:r>
               <a:rPr lang="en-US" dirty="0" smtClean="0"/>
-              <a:t>Conn/Database/</a:t>
-            </a:r>
-            <a:r>
-              <a:rPr lang="en-US" dirty="0" err="1" smtClean="0"/>
-              <a:t>Desc</a:t>
+              <a:t>Connection/</a:t>
             </a:r>
             <a:r>
               <a:rPr lang="en-US" dirty="0" smtClean="0"/>
-              <a:t> SS</a:t>
+              <a:t>Database/</a:t>
+            </a:r>
+            <a:r>
+              <a:rPr lang="en-US" dirty="0" smtClean="0"/>
+              <a:t>Description</a:t>
             </a:r>
             <a:endParaRPr lang="en-US" dirty="0"/>
           </a:p>
@@ -4727,7 +4735,7 @@
 </file>
 
 <file path=ppt/slides/slide14.xml><?xml version="1.0" encoding="utf-8"?>
-<p:sld xmlns:a="http://schemas.openxmlformats.org/drawingml/2006/main" xmlns:r="http://schemas.openxmlformats.org/officeDocument/2006/relationships" xmlns:p="http://schemas.openxmlformats.org/presentationml/2006/main">
+<p:sld xmlns:a="http://schemas.openxmlformats.org/drawingml/2006/main" xmlns:r="http://schemas.openxmlformats.org/officeDocument/2006/relationships" xmlns:mc="http://schemas.openxmlformats.org/markup-compatibility/2006" xmlns:mv="urn:schemas-microsoft-com:mac:vml" xmlns:p="http://schemas.openxmlformats.org/presentationml/2006/main" mc:Ignorable="mv" mc:PreserveAttributes="mv:*">
   <p:cSld>
     <p:spTree>
       <p:nvGrpSpPr>
@@ -4798,7 +4806,7 @@
 </file>
 
 <file path=ppt/slides/slide15.xml><?xml version="1.0" encoding="utf-8"?>
-<p:sld xmlns:a="http://schemas.openxmlformats.org/drawingml/2006/main" xmlns:r="http://schemas.openxmlformats.org/officeDocument/2006/relationships" xmlns:p="http://schemas.openxmlformats.org/presentationml/2006/main">
+<p:sld xmlns:a="http://schemas.openxmlformats.org/drawingml/2006/main" xmlns:r="http://schemas.openxmlformats.org/officeDocument/2006/relationships" xmlns:mc="http://schemas.openxmlformats.org/markup-compatibility/2006" xmlns:mv="urn:schemas-microsoft-com:mac:vml" xmlns:p="http://schemas.openxmlformats.org/presentationml/2006/main" mc:Ignorable="mv" mc:PreserveAttributes="mv:*">
   <p:cSld>
     <p:spTree>
       <p:nvGrpSpPr>
@@ -4869,7 +4877,7 @@
 </file>
 
 <file path=ppt/slides/slide16.xml><?xml version="1.0" encoding="utf-8"?>
-<p:sld xmlns:a="http://schemas.openxmlformats.org/drawingml/2006/main" xmlns:r="http://schemas.openxmlformats.org/officeDocument/2006/relationships" xmlns:p="http://schemas.openxmlformats.org/presentationml/2006/main">
+<p:sld xmlns:a="http://schemas.openxmlformats.org/drawingml/2006/main" xmlns:r="http://schemas.openxmlformats.org/officeDocument/2006/relationships" xmlns:mc="http://schemas.openxmlformats.org/markup-compatibility/2006" xmlns:mv="urn:schemas-microsoft-com:mac:vml" xmlns:p="http://schemas.openxmlformats.org/presentationml/2006/main" mc:Ignorable="mv" mc:PreserveAttributes="mv:*">
   <p:cSld>
     <p:spTree>
       <p:nvGrpSpPr>
@@ -4940,7 +4948,7 @@
 </file>
 
 <file path=ppt/slides/slide17.xml><?xml version="1.0" encoding="utf-8"?>
-<p:sld xmlns:a="http://schemas.openxmlformats.org/drawingml/2006/main" xmlns:r="http://schemas.openxmlformats.org/officeDocument/2006/relationships" xmlns:p="http://schemas.openxmlformats.org/presentationml/2006/main">
+<p:sld xmlns:a="http://schemas.openxmlformats.org/drawingml/2006/main" xmlns:r="http://schemas.openxmlformats.org/officeDocument/2006/relationships" xmlns:mc="http://schemas.openxmlformats.org/markup-compatibility/2006" xmlns:mv="urn:schemas-microsoft-com:mac:vml" xmlns:p="http://schemas.openxmlformats.org/presentationml/2006/main" mc:Ignorable="mv" mc:PreserveAttributes="mv:*">
   <p:cSld>
     <p:spTree>
       <p:nvGrpSpPr>
@@ -5011,7 +5019,7 @@
 </file>
 
 <file path=ppt/slides/slide18.xml><?xml version="1.0" encoding="utf-8"?>
-<p:sld xmlns:a="http://schemas.openxmlformats.org/drawingml/2006/main" xmlns:r="http://schemas.openxmlformats.org/officeDocument/2006/relationships" xmlns:p="http://schemas.openxmlformats.org/presentationml/2006/main">
+<p:sld xmlns:a="http://schemas.openxmlformats.org/drawingml/2006/main" xmlns:r="http://schemas.openxmlformats.org/officeDocument/2006/relationships" xmlns:mc="http://schemas.openxmlformats.org/markup-compatibility/2006" xmlns:mv="urn:schemas-microsoft-com:mac:vml" xmlns:p="http://schemas.openxmlformats.org/presentationml/2006/main" mc:Ignorable="mv" mc:PreserveAttributes="mv:*">
   <p:cSld>
     <p:spTree>
       <p:nvGrpSpPr>
@@ -5082,7 +5090,7 @@
 </file>
 
 <file path=ppt/slides/slide19.xml><?xml version="1.0" encoding="utf-8"?>
-<p:sld xmlns:a="http://schemas.openxmlformats.org/drawingml/2006/main" xmlns:r="http://schemas.openxmlformats.org/officeDocument/2006/relationships" xmlns:p="http://schemas.openxmlformats.org/presentationml/2006/main">
+<p:sld xmlns:a="http://schemas.openxmlformats.org/drawingml/2006/main" xmlns:r="http://schemas.openxmlformats.org/officeDocument/2006/relationships" xmlns:mc="http://schemas.openxmlformats.org/markup-compatibility/2006" xmlns:mv="urn:schemas-microsoft-com:mac:vml" xmlns:p="http://schemas.openxmlformats.org/presentationml/2006/main" mc:Ignorable="mv" mc:PreserveAttributes="mv:*">
   <p:cSld>
     <p:spTree>
       <p:nvGrpSpPr>
@@ -5178,7 +5186,7 @@
 </file>
 
 <file path=ppt/slides/slide2.xml><?xml version="1.0" encoding="utf-8"?>
-<p:sld xmlns:a="http://schemas.openxmlformats.org/drawingml/2006/main" xmlns:r="http://schemas.openxmlformats.org/officeDocument/2006/relationships" xmlns:p="http://schemas.openxmlformats.org/presentationml/2006/main">
+<p:sld xmlns:a="http://schemas.openxmlformats.org/drawingml/2006/main" xmlns:r="http://schemas.openxmlformats.org/officeDocument/2006/relationships" xmlns:mc="http://schemas.openxmlformats.org/markup-compatibility/2006" xmlns:mv="urn:schemas-microsoft-com:mac:vml" xmlns:p="http://schemas.openxmlformats.org/presentationml/2006/main" mc:Ignorable="mv" mc:PreserveAttributes="mv:*">
   <p:cSld>
     <p:spTree>
       <p:nvGrpSpPr>
@@ -5257,7 +5265,7 @@
         </p:spPr>
         <p:txBody>
           <a:bodyPr lIns="82945" tIns="41473" rIns="82945" bIns="41473">
-            <a:normAutofit fontScale="92500" lnSpcReduction="10000"/>
+            <a:normAutofit fontScale="92500"/>
           </a:bodyPr>
           <a:lstStyle/>
           <a:p>
@@ -5449,7 +5457,7 @@
 </file>
 
 <file path=ppt/slides/slide20.xml><?xml version="1.0" encoding="utf-8"?>
-<p:sld xmlns:a="http://schemas.openxmlformats.org/drawingml/2006/main" xmlns:r="http://schemas.openxmlformats.org/officeDocument/2006/relationships" xmlns:p="http://schemas.openxmlformats.org/presentationml/2006/main">
+<p:sld xmlns:a="http://schemas.openxmlformats.org/drawingml/2006/main" xmlns:r="http://schemas.openxmlformats.org/officeDocument/2006/relationships" xmlns:mc="http://schemas.openxmlformats.org/markup-compatibility/2006" xmlns:mv="urn:schemas-microsoft-com:mac:vml" xmlns:p="http://schemas.openxmlformats.org/presentationml/2006/main" mc:Ignorable="mv" mc:PreserveAttributes="mv:*">
   <p:cSld>
     <p:spTree>
       <p:nvGrpSpPr>
@@ -5541,7 +5549,7 @@
 </file>
 
 <file path=ppt/slides/slide21.xml><?xml version="1.0" encoding="utf-8"?>
-<p:sld xmlns:a="http://schemas.openxmlformats.org/drawingml/2006/main" xmlns:r="http://schemas.openxmlformats.org/officeDocument/2006/relationships" xmlns:p="http://schemas.openxmlformats.org/presentationml/2006/main">
+<p:sld xmlns:a="http://schemas.openxmlformats.org/drawingml/2006/main" xmlns:r="http://schemas.openxmlformats.org/officeDocument/2006/relationships" xmlns:mc="http://schemas.openxmlformats.org/markup-compatibility/2006" xmlns:mv="urn:schemas-microsoft-com:mac:vml" xmlns:p="http://schemas.openxmlformats.org/presentationml/2006/main" mc:Ignorable="mv" mc:PreserveAttributes="mv:*">
   <p:cSld>
     <p:spTree>
       <p:nvGrpSpPr>
@@ -5601,7 +5609,7 @@
 </file>
 
 <file path=ppt/slides/slide3.xml><?xml version="1.0" encoding="utf-8"?>
-<p:sld xmlns:a="http://schemas.openxmlformats.org/drawingml/2006/main" xmlns:r="http://schemas.openxmlformats.org/officeDocument/2006/relationships" xmlns:p="http://schemas.openxmlformats.org/presentationml/2006/main">
+<p:sld xmlns:a="http://schemas.openxmlformats.org/drawingml/2006/main" xmlns:r="http://schemas.openxmlformats.org/officeDocument/2006/relationships" xmlns:mc="http://schemas.openxmlformats.org/markup-compatibility/2006" xmlns:mv="urn:schemas-microsoft-com:mac:vml" xmlns:p="http://schemas.openxmlformats.org/presentationml/2006/main" mc:Ignorable="mv" mc:PreserveAttributes="mv:*">
   <p:cSld>
     <p:spTree>
       <p:nvGrpSpPr>
@@ -5874,7 +5882,7 @@
 </file>
 
 <file path=ppt/slides/slide4.xml><?xml version="1.0" encoding="utf-8"?>
-<p:sld xmlns:a="http://schemas.openxmlformats.org/drawingml/2006/main" xmlns:r="http://schemas.openxmlformats.org/officeDocument/2006/relationships" xmlns:p="http://schemas.openxmlformats.org/presentationml/2006/main">
+<p:sld xmlns:a="http://schemas.openxmlformats.org/drawingml/2006/main" xmlns:r="http://schemas.openxmlformats.org/officeDocument/2006/relationships" xmlns:mc="http://schemas.openxmlformats.org/markup-compatibility/2006" xmlns:mv="urn:schemas-microsoft-com:mac:vml" xmlns:p="http://schemas.openxmlformats.org/presentationml/2006/main" mc:Ignorable="mv" mc:PreserveAttributes="mv:*">
   <p:cSld>
     <p:spTree>
       <p:nvGrpSpPr>
@@ -6149,7 +6157,7 @@
 </file>
 
 <file path=ppt/slides/slide5.xml><?xml version="1.0" encoding="utf-8"?>
-<p:sld xmlns:a="http://schemas.openxmlformats.org/drawingml/2006/main" xmlns:r="http://schemas.openxmlformats.org/officeDocument/2006/relationships" xmlns:p="http://schemas.openxmlformats.org/presentationml/2006/main">
+<p:sld xmlns:a="http://schemas.openxmlformats.org/drawingml/2006/main" xmlns:r="http://schemas.openxmlformats.org/officeDocument/2006/relationships" xmlns:mc="http://schemas.openxmlformats.org/markup-compatibility/2006" xmlns:mv="urn:schemas-microsoft-com:mac:vml" xmlns:p="http://schemas.openxmlformats.org/presentationml/2006/main" mc:Ignorable="mv" mc:PreserveAttributes="mv:*">
   <p:cSld>
     <p:spTree>
       <p:nvGrpSpPr>
@@ -6267,7 +6275,7 @@
 </file>
 
 <file path=ppt/slides/slide6.xml><?xml version="1.0" encoding="utf-8"?>
-<p:sld xmlns:a="http://schemas.openxmlformats.org/drawingml/2006/main" xmlns:r="http://schemas.openxmlformats.org/officeDocument/2006/relationships" xmlns:p="http://schemas.openxmlformats.org/presentationml/2006/main">
+<p:sld xmlns:a="http://schemas.openxmlformats.org/drawingml/2006/main" xmlns:r="http://schemas.openxmlformats.org/officeDocument/2006/relationships" xmlns:mc="http://schemas.openxmlformats.org/markup-compatibility/2006" xmlns:mv="urn:schemas-microsoft-com:mac:vml" xmlns:p="http://schemas.openxmlformats.org/presentationml/2006/main" mc:Ignorable="mv" mc:PreserveAttributes="mv:*">
   <p:cSld>
     <p:spTree>
       <p:nvGrpSpPr>
@@ -6365,7 +6373,7 @@
 </file>
 
 <file path=ppt/slides/slide7.xml><?xml version="1.0" encoding="utf-8"?>
-<p:sld xmlns:a="http://schemas.openxmlformats.org/drawingml/2006/main" xmlns:r="http://schemas.openxmlformats.org/officeDocument/2006/relationships" xmlns:p="http://schemas.openxmlformats.org/presentationml/2006/main">
+<p:sld xmlns:a="http://schemas.openxmlformats.org/drawingml/2006/main" xmlns:r="http://schemas.openxmlformats.org/officeDocument/2006/relationships" xmlns:mc="http://schemas.openxmlformats.org/markup-compatibility/2006" xmlns:mv="urn:schemas-microsoft-com:mac:vml" xmlns:p="http://schemas.openxmlformats.org/presentationml/2006/main" mc:Ignorable="mv" mc:PreserveAttributes="mv:*">
   <p:cSld>
     <p:spTree>
       <p:nvGrpSpPr>
@@ -6474,7 +6482,7 @@
 </file>
 
 <file path=ppt/slides/slide8.xml><?xml version="1.0" encoding="utf-8"?>
-<p:sld xmlns:a="http://schemas.openxmlformats.org/drawingml/2006/main" xmlns:r="http://schemas.openxmlformats.org/officeDocument/2006/relationships" xmlns:p="http://schemas.openxmlformats.org/presentationml/2006/main">
+<p:sld xmlns:a="http://schemas.openxmlformats.org/drawingml/2006/main" xmlns:r="http://schemas.openxmlformats.org/officeDocument/2006/relationships" xmlns:mc="http://schemas.openxmlformats.org/markup-compatibility/2006" xmlns:mv="urn:schemas-microsoft-com:mac:vml" xmlns:p="http://schemas.openxmlformats.org/presentationml/2006/main" mc:Ignorable="mv" mc:PreserveAttributes="mv:*">
   <p:cSld>
     <p:spTree>
       <p:nvGrpSpPr>
@@ -6582,7 +6590,7 @@
 </file>
 
 <file path=ppt/slides/slide9.xml><?xml version="1.0" encoding="utf-8"?>
-<p:sld xmlns:a="http://schemas.openxmlformats.org/drawingml/2006/main" xmlns:r="http://schemas.openxmlformats.org/officeDocument/2006/relationships" xmlns:p="http://schemas.openxmlformats.org/presentationml/2006/main">
+<p:sld xmlns:a="http://schemas.openxmlformats.org/drawingml/2006/main" xmlns:r="http://schemas.openxmlformats.org/officeDocument/2006/relationships" xmlns:mc="http://schemas.openxmlformats.org/markup-compatibility/2006" xmlns:mv="urn:schemas-microsoft-com:mac:vml" xmlns:p="http://schemas.openxmlformats.org/presentationml/2006/main" mc:Ignorable="mv" mc:PreserveAttributes="mv:*">
   <p:cSld>
     <p:spTree>
       <p:nvGrpSpPr>

</xml_diff>